<commit_message>
improve tables and add big picture slide
</commit_message>
<xml_diff>
--- a/Fundamentals/pollacks_rule/lecture_slides_pi.pptx
+++ b/Fundamentals/pollacks_rule/lecture_slides_pi.pptx
@@ -5,30 +5,31 @@
     <p:sldMasterId id="2147483648" r:id="rId1"/>
   </p:sldMasterIdLst>
   <p:notesMasterIdLst>
-    <p:notesMasterId r:id="rId23"/>
+    <p:notesMasterId r:id="rId24"/>
   </p:notesMasterIdLst>
   <p:sldIdLst>
     <p:sldId id="256" r:id="rId2"/>
-    <p:sldId id="258" r:id="rId3"/>
-    <p:sldId id="260" r:id="rId4"/>
-    <p:sldId id="261" r:id="rId5"/>
-    <p:sldId id="262" r:id="rId6"/>
-    <p:sldId id="269" r:id="rId7"/>
-    <p:sldId id="312" r:id="rId8"/>
-    <p:sldId id="263" r:id="rId9"/>
-    <p:sldId id="266" r:id="rId10"/>
-    <p:sldId id="267" r:id="rId11"/>
-    <p:sldId id="268" r:id="rId12"/>
-    <p:sldId id="270" r:id="rId13"/>
-    <p:sldId id="271" r:id="rId14"/>
-    <p:sldId id="280" r:id="rId15"/>
-    <p:sldId id="286" r:id="rId16"/>
-    <p:sldId id="283" r:id="rId17"/>
-    <p:sldId id="287" r:id="rId18"/>
-    <p:sldId id="279" r:id="rId19"/>
-    <p:sldId id="284" r:id="rId20"/>
-    <p:sldId id="310" r:id="rId21"/>
-    <p:sldId id="311" r:id="rId22"/>
+    <p:sldId id="314" r:id="rId3"/>
+    <p:sldId id="258" r:id="rId4"/>
+    <p:sldId id="260" r:id="rId5"/>
+    <p:sldId id="261" r:id="rId6"/>
+    <p:sldId id="262" r:id="rId7"/>
+    <p:sldId id="269" r:id="rId8"/>
+    <p:sldId id="312" r:id="rId9"/>
+    <p:sldId id="263" r:id="rId10"/>
+    <p:sldId id="266" r:id="rId11"/>
+    <p:sldId id="267" r:id="rId12"/>
+    <p:sldId id="268" r:id="rId13"/>
+    <p:sldId id="313" r:id="rId14"/>
+    <p:sldId id="271" r:id="rId15"/>
+    <p:sldId id="280" r:id="rId16"/>
+    <p:sldId id="286" r:id="rId17"/>
+    <p:sldId id="283" r:id="rId18"/>
+    <p:sldId id="287" r:id="rId19"/>
+    <p:sldId id="279" r:id="rId20"/>
+    <p:sldId id="284" r:id="rId21"/>
+    <p:sldId id="315" r:id="rId22"/>
+    <p:sldId id="311" r:id="rId23"/>
   </p:sldIdLst>
   <p:sldSz cx="9144000" cy="6858000" type="screen4x3"/>
   <p:notesSz cx="6858000" cy="9144000"/>
@@ -228,7 +229,7 @@
           <a:p>
             <a:fld id="{9469DB13-C22C-F442-B7F3-F9EB0490D9DD}" type="datetimeFigureOut">
               <a:rPr lang="en-US" smtClean="0"/>
-              <a:t>7/2/20</a:t>
+              <a:t>7/18/22</a:t>
             </a:fld>
             <a:endParaRPr lang="en-US"/>
           </a:p>
@@ -661,7 +662,7 @@
           <a:p>
             <a:fld id="{BCFD7BB8-316F-7145-A6FC-E023150F8C1F}" type="slidenum">
               <a:rPr lang="en-US" smtClean="0"/>
-              <a:t>7</a:t>
+              <a:t>8</a:t>
             </a:fld>
             <a:endParaRPr lang="en-US"/>
           </a:p>
@@ -745,7 +746,7 @@
           <a:p>
             <a:fld id="{BCFD7BB8-316F-7145-A6FC-E023150F8C1F}" type="slidenum">
               <a:rPr lang="en-US" smtClean="0"/>
-              <a:t>12</a:t>
+              <a:t>13</a:t>
             </a:fld>
             <a:endParaRPr lang="en-US"/>
           </a:p>
@@ -840,7 +841,7 @@
           <a:p>
             <a:fld id="{BCFD7BB8-316F-7145-A6FC-E023150F8C1F}" type="slidenum">
               <a:rPr lang="en-US" smtClean="0"/>
-              <a:t>21</a:t>
+              <a:t>22</a:t>
             </a:fld>
             <a:endParaRPr lang="en-US"/>
           </a:p>
@@ -1038,7 +1039,7 @@
           <a:p>
             <a:fld id="{E0BDE9C3-A99F-B542-B075-08FB2E26F2F2}" type="datetimeFigureOut">
               <a:rPr lang="en-US" smtClean="0"/>
-              <a:t>7/2/20</a:t>
+              <a:t>7/18/22</a:t>
             </a:fld>
             <a:endParaRPr lang="en-US"/>
           </a:p>
@@ -1201,7 +1202,7 @@
           <a:p>
             <a:fld id="{E0BDE9C3-A99F-B542-B075-08FB2E26F2F2}" type="datetimeFigureOut">
               <a:rPr lang="en-US" smtClean="0"/>
-              <a:t>7/2/20</a:t>
+              <a:t>7/18/22</a:t>
             </a:fld>
             <a:endParaRPr lang="en-US"/>
           </a:p>
@@ -1374,7 +1375,7 @@
           <a:p>
             <a:fld id="{E0BDE9C3-A99F-B542-B075-08FB2E26F2F2}" type="datetimeFigureOut">
               <a:rPr lang="en-US" smtClean="0"/>
-              <a:t>7/2/20</a:t>
+              <a:t>7/18/22</a:t>
             </a:fld>
             <a:endParaRPr lang="en-US"/>
           </a:p>
@@ -1537,7 +1538,7 @@
           <a:p>
             <a:fld id="{E0BDE9C3-A99F-B542-B075-08FB2E26F2F2}" type="datetimeFigureOut">
               <a:rPr lang="en-US" smtClean="0"/>
-              <a:t>7/2/20</a:t>
+              <a:t>7/18/22</a:t>
             </a:fld>
             <a:endParaRPr lang="en-US"/>
           </a:p>
@@ -1777,7 +1778,7 @@
           <a:p>
             <a:fld id="{E0BDE9C3-A99F-B542-B075-08FB2E26F2F2}" type="datetimeFigureOut">
               <a:rPr lang="en-US" smtClean="0"/>
-              <a:t>7/2/20</a:t>
+              <a:t>7/18/22</a:t>
             </a:fld>
             <a:endParaRPr lang="en-US"/>
           </a:p>
@@ -2057,7 +2058,7 @@
           <a:p>
             <a:fld id="{E0BDE9C3-A99F-B542-B075-08FB2E26F2F2}" type="datetimeFigureOut">
               <a:rPr lang="en-US" smtClean="0"/>
-              <a:t>7/2/20</a:t>
+              <a:t>7/18/22</a:t>
             </a:fld>
             <a:endParaRPr lang="en-US"/>
           </a:p>
@@ -2471,7 +2472,7 @@
           <a:p>
             <a:fld id="{E0BDE9C3-A99F-B542-B075-08FB2E26F2F2}" type="datetimeFigureOut">
               <a:rPr lang="en-US" smtClean="0"/>
-              <a:t>7/2/20</a:t>
+              <a:t>7/18/22</a:t>
             </a:fld>
             <a:endParaRPr lang="en-US"/>
           </a:p>
@@ -2583,7 +2584,7 @@
           <a:p>
             <a:fld id="{E0BDE9C3-A99F-B542-B075-08FB2E26F2F2}" type="datetimeFigureOut">
               <a:rPr lang="en-US" smtClean="0"/>
-              <a:t>7/2/20</a:t>
+              <a:t>7/18/22</a:t>
             </a:fld>
             <a:endParaRPr lang="en-US"/>
           </a:p>
@@ -2673,7 +2674,7 @@
           <a:p>
             <a:fld id="{E0BDE9C3-A99F-B542-B075-08FB2E26F2F2}" type="datetimeFigureOut">
               <a:rPr lang="en-US" smtClean="0"/>
-              <a:t>7/2/20</a:t>
+              <a:t>7/18/22</a:t>
             </a:fld>
             <a:endParaRPr lang="en-US"/>
           </a:p>
@@ -2943,7 +2944,7 @@
           <a:p>
             <a:fld id="{E0BDE9C3-A99F-B542-B075-08FB2E26F2F2}" type="datetimeFigureOut">
               <a:rPr lang="en-US" smtClean="0"/>
-              <a:t>7/2/20</a:t>
+              <a:t>7/18/22</a:t>
             </a:fld>
             <a:endParaRPr lang="en-US"/>
           </a:p>
@@ -3190,7 +3191,7 @@
           <a:p>
             <a:fld id="{E0BDE9C3-A99F-B542-B075-08FB2E26F2F2}" type="datetimeFigureOut">
               <a:rPr lang="en-US" smtClean="0"/>
-              <a:t>7/2/20</a:t>
+              <a:t>7/18/22</a:t>
             </a:fld>
             <a:endParaRPr lang="en-US"/>
           </a:p>
@@ -3396,7 +3397,7 @@
           <a:p>
             <a:fld id="{E0BDE9C3-A99F-B542-B075-08FB2E26F2F2}" type="datetimeFigureOut">
               <a:rPr lang="en-US" smtClean="0"/>
-              <a:t>7/2/20</a:t>
+              <a:t>7/18/22</a:t>
             </a:fld>
             <a:endParaRPr lang="en-US"/>
           </a:p>
@@ -3863,9 +3864,10 @@
           <a:lstStyle/>
           <a:p>
             <a:r>
-              <a:rPr lang="en-US" sz="3600" dirty="0"/>
-              <a:t>By what factor does the running time of a program that can be 90% parallelized change on 4 equal-sized cores?</a:t>
-            </a:r>
+              <a:rPr lang="en-US" sz="3600"/>
+              <a:t>By what factor does the running time of a program that can be 75% parallelized change on 4 equal-sized cores?</a:t>
+            </a:r>
+            <a:endParaRPr lang="en-US" sz="3600" dirty="0"/>
           </a:p>
         </p:txBody>
       </p:sp>
@@ -3898,7 +3900,7 @@
             </a:pPr>
             <a:r>
               <a:rPr lang="en-US" dirty="0"/>
-              <a:t>0.45</a:t>
+              <a:t>0.6</a:t>
             </a:r>
           </a:p>
           <a:p>
@@ -3910,8 +3912,20 @@
               <a:buAutoNum type="alphaUcPeriod"/>
             </a:pPr>
             <a:r>
-              <a:rPr lang="en-US" dirty="0"/>
-              <a:t>0.65</a:t>
+              <a:rPr lang="en-US" u="sng" dirty="0">
+                <a:solidFill>
+                  <a:schemeClr val="accent1"/>
+                </a:solidFill>
+              </a:rPr>
+              <a:t>0.875</a:t>
+            </a:r>
+            <a:r>
+              <a:rPr lang="en-US" dirty="0">
+                <a:solidFill>
+                  <a:schemeClr val="accent1"/>
+                </a:solidFill>
+              </a:rPr>
+              <a:t>   (0.75/2 + 0.25/0.5)</a:t>
             </a:r>
           </a:p>
           <a:p>
@@ -3924,7 +3938,7 @@
             </a:pPr>
             <a:r>
               <a:rPr lang="en-US" dirty="0"/>
-              <a:t>0.765</a:t>
+              <a:t>1</a:t>
             </a:r>
           </a:p>
           <a:p>
@@ -3937,7 +3951,7 @@
             </a:pPr>
             <a:r>
               <a:rPr lang="en-US" dirty="0"/>
-              <a:t>1</a:t>
+              <a:t>1.35</a:t>
             </a:r>
           </a:p>
           <a:p>
@@ -4050,20 +4064,8 @@
               <a:buAutoNum type="alphaUcPeriod"/>
             </a:pPr>
             <a:r>
-              <a:rPr lang="en-US" u="sng" dirty="0">
-                <a:solidFill>
-                  <a:schemeClr val="accent1"/>
-                </a:solidFill>
-              </a:rPr>
+              <a:rPr lang="en-US" dirty="0"/>
               <a:t>0.65</a:t>
-            </a:r>
-            <a:r>
-              <a:rPr lang="en-US" dirty="0">
-                <a:solidFill>
-                  <a:schemeClr val="accent1"/>
-                </a:solidFill>
-              </a:rPr>
-              <a:t>   (0.9/2 + 0.1/0.5)</a:t>
             </a:r>
           </a:p>
           <a:p>
@@ -4142,6 +4144,158 @@
             <p:ph type="title"/>
           </p:nvPr>
         </p:nvSpPr>
+        <p:spPr>
+          <a:xfrm>
+            <a:off x="457200" y="274638"/>
+            <a:ext cx="8229600" cy="1553018"/>
+          </a:xfrm>
+        </p:spPr>
+        <p:txBody>
+          <a:bodyPr>
+            <a:noAutofit/>
+          </a:bodyPr>
+          <a:lstStyle/>
+          <a:p>
+            <a:r>
+              <a:rPr lang="en-US" sz="3600" dirty="0"/>
+              <a:t>By what factor does the running time of a program that can be 90% parallelized change on 4 equal-sized cores?</a:t>
+            </a:r>
+          </a:p>
+        </p:txBody>
+      </p:sp>
+      <p:sp>
+        <p:nvSpPr>
+          <p:cNvPr id="3" name="Content Placeholder 2"/>
+          <p:cNvSpPr>
+            <a:spLocks noGrp="1"/>
+          </p:cNvSpPr>
+          <p:nvPr>
+            <p:ph idx="1"/>
+          </p:nvPr>
+        </p:nvSpPr>
+        <p:spPr>
+          <a:xfrm>
+            <a:off x="457200" y="2085072"/>
+            <a:ext cx="8229600" cy="4041091"/>
+          </a:xfrm>
+        </p:spPr>
+        <p:txBody>
+          <a:bodyPr/>
+          <a:lstStyle/>
+          <a:p>
+            <a:pPr marL="514350" indent="-514350">
+              <a:spcAft>
+                <a:spcPts val="600"/>
+              </a:spcAft>
+              <a:buFont typeface="+mj-lt"/>
+              <a:buAutoNum type="alphaUcPeriod"/>
+            </a:pPr>
+            <a:r>
+              <a:rPr lang="en-US" dirty="0"/>
+              <a:t>0.45</a:t>
+            </a:r>
+          </a:p>
+          <a:p>
+            <a:pPr marL="514350" indent="-514350">
+              <a:spcAft>
+                <a:spcPts val="600"/>
+              </a:spcAft>
+              <a:buFont typeface="+mj-lt"/>
+              <a:buAutoNum type="alphaUcPeriod"/>
+            </a:pPr>
+            <a:r>
+              <a:rPr lang="en-US" u="sng" dirty="0">
+                <a:solidFill>
+                  <a:schemeClr val="accent1"/>
+                </a:solidFill>
+              </a:rPr>
+              <a:t>0.65</a:t>
+            </a:r>
+            <a:r>
+              <a:rPr lang="en-US" dirty="0">
+                <a:solidFill>
+                  <a:schemeClr val="accent1"/>
+                </a:solidFill>
+              </a:rPr>
+              <a:t>   (0.9/2 + 0.1/0.5)</a:t>
+            </a:r>
+          </a:p>
+          <a:p>
+            <a:pPr marL="514350" indent="-514350">
+              <a:spcAft>
+                <a:spcPts val="600"/>
+              </a:spcAft>
+              <a:buFont typeface="+mj-lt"/>
+              <a:buAutoNum type="alphaUcPeriod"/>
+            </a:pPr>
+            <a:r>
+              <a:rPr lang="en-US" dirty="0"/>
+              <a:t>0.765</a:t>
+            </a:r>
+          </a:p>
+          <a:p>
+            <a:pPr marL="514350" indent="-514350">
+              <a:spcAft>
+                <a:spcPts val="600"/>
+              </a:spcAft>
+              <a:buFont typeface="+mj-lt"/>
+              <a:buAutoNum type="alphaUcPeriod"/>
+            </a:pPr>
+            <a:r>
+              <a:rPr lang="en-US" dirty="0"/>
+              <a:t>1</a:t>
+            </a:r>
+          </a:p>
+          <a:p>
+            <a:pPr marL="514350" indent="-514350">
+              <a:spcAft>
+                <a:spcPts val="600"/>
+              </a:spcAft>
+              <a:buFont typeface="+mj-lt"/>
+              <a:buAutoNum type="alphaUcPeriod"/>
+            </a:pPr>
+            <a:r>
+              <a:rPr lang="en-US" dirty="0"/>
+              <a:t>None of the above</a:t>
+            </a:r>
+          </a:p>
+        </p:txBody>
+      </p:sp>
+    </p:spTree>
+  </p:cSld>
+  <p:clrMapOvr>
+    <a:masterClrMapping/>
+  </p:clrMapOvr>
+</p:sld>
+</file>
+
+<file path=ppt/slides/slide13.xml><?xml version="1.0" encoding="utf-8"?>
+<p:sld xmlns:a="http://schemas.openxmlformats.org/drawingml/2006/main" xmlns:r="http://schemas.openxmlformats.org/officeDocument/2006/relationships" xmlns:p="http://schemas.openxmlformats.org/presentationml/2006/main">
+  <p:cSld>
+    <p:spTree>
+      <p:nvGrpSpPr>
+        <p:cNvPr id="1" name=""/>
+        <p:cNvGrpSpPr/>
+        <p:nvPr/>
+      </p:nvGrpSpPr>
+      <p:grpSpPr>
+        <a:xfrm>
+          <a:off x="0" y="0"/>
+          <a:ext cx="0" cy="0"/>
+          <a:chOff x="0" y="0"/>
+          <a:chExt cx="0" cy="0"/>
+        </a:xfrm>
+      </p:grpSpPr>
+      <p:sp>
+        <p:nvSpPr>
+          <p:cNvPr id="2" name="Title 1"/>
+          <p:cNvSpPr>
+            <a:spLocks noGrp="1"/>
+          </p:cNvSpPr>
+          <p:nvPr>
+            <p:ph type="title"/>
+          </p:nvPr>
+        </p:nvSpPr>
         <p:spPr/>
         <p:txBody>
           <a:bodyPr>
@@ -4164,16 +4318,11 @@
           </p:cNvGraphicFramePr>
           <p:nvPr>
             <p:ph idx="1"/>
-            <p:extLst>
-              <p:ext uri="{D42A27DB-BD31-4B8C-83A1-F6EECF244321}">
-                <p14:modId xmlns:p14="http://schemas.microsoft.com/office/powerpoint/2010/main" val="2466849480"/>
-              </p:ext>
-            </p:extLst>
           </p:nvPr>
         </p:nvGraphicFramePr>
         <p:xfrm>
-          <a:off x="457200" y="1600200"/>
-          <a:ext cx="8229600" cy="2865210"/>
+          <a:off x="457200" y="1946865"/>
+          <a:ext cx="8229600" cy="2595970"/>
         </p:xfrm>
         <a:graphic>
           <a:graphicData uri="http://schemas.openxmlformats.org/drawingml/2006/table">
@@ -4218,14 +4367,6 @@
                     <a:lstStyle/>
                     <a:p>
                       <a:pPr algn="ctr"/>
-                      <a:r>
-                        <a:rPr lang="en-US" dirty="0"/>
-                        <a:t>% of program that</a:t>
-                      </a:r>
-                      <a:r>
-                        <a:rPr lang="en-US" baseline="0" dirty="0"/>
-                        <a:t> is parallelizable</a:t>
-                      </a:r>
                       <a:endParaRPr lang="en-US" dirty="0">
                         <a:solidFill>
                           <a:schemeClr val="tx1"/>
@@ -4874,6 +5015,41 @@
           </a:p>
         </p:txBody>
       </p:sp>
+      <p:sp>
+        <p:nvSpPr>
+          <p:cNvPr id="5" name="TextBox 4">
+            <a:extLst>
+              <a:ext uri="{FF2B5EF4-FFF2-40B4-BE49-F238E27FC236}">
+                <a16:creationId xmlns:a16="http://schemas.microsoft.com/office/drawing/2014/main" id="{8E016A55-87EF-5E72-0C37-281FD4CA3BF4}"/>
+              </a:ext>
+            </a:extLst>
+          </p:cNvPr>
+          <p:cNvSpPr txBox="1"/>
+          <p:nvPr/>
+        </p:nvSpPr>
+        <p:spPr>
+          <a:xfrm>
+            <a:off x="3759200" y="1577533"/>
+            <a:ext cx="3788080" cy="369332"/>
+          </a:xfrm>
+          <a:prstGeom prst="rect">
+            <a:avLst/>
+          </a:prstGeom>
+          <a:noFill/>
+        </p:spPr>
+        <p:txBody>
+          <a:bodyPr wrap="square" rtlCol="0">
+            <a:spAutoFit/>
+          </a:bodyPr>
+          <a:lstStyle/>
+          <a:p>
+            <a:r>
+              <a:rPr lang="en-US" dirty="0"/>
+              <a:t>% of program that can be parallelized</a:t>
+            </a:r>
+          </a:p>
+        </p:txBody>
+      </p:sp>
     </p:spTree>
   </p:cSld>
   <p:clrMapOvr>
@@ -4882,7 +5058,7 @@
 </p:sld>
 </file>
 
-<file path=ppt/slides/slide13.xml><?xml version="1.0" encoding="utf-8"?>
+<file path=ppt/slides/slide14.xml><?xml version="1.0" encoding="utf-8"?>
 <p:sld xmlns:a="http://schemas.openxmlformats.org/drawingml/2006/main" xmlns:r="http://schemas.openxmlformats.org/officeDocument/2006/relationships" xmlns:p="http://schemas.openxmlformats.org/presentationml/2006/main">
   <p:cSld>
     <p:spTree>
@@ -5228,7 +5404,7 @@
 </p:sld>
 </file>
 
-<file path=ppt/slides/slide14.xml><?xml version="1.0" encoding="utf-8"?>
+<file path=ppt/slides/slide15.xml><?xml version="1.0" encoding="utf-8"?>
 <p:sld xmlns:a="http://schemas.openxmlformats.org/drawingml/2006/main" xmlns:r="http://schemas.openxmlformats.org/officeDocument/2006/relationships" xmlns:p="http://schemas.openxmlformats.org/presentationml/2006/main">
   <p:cSld>
     <p:spTree>
@@ -5632,7 +5808,7 @@
 </p:sld>
 </file>
 
-<file path=ppt/slides/slide15.xml><?xml version="1.0" encoding="utf-8"?>
+<file path=ppt/slides/slide16.xml><?xml version="1.0" encoding="utf-8"?>
 <p:sld xmlns:a="http://schemas.openxmlformats.org/drawingml/2006/main" xmlns:r="http://schemas.openxmlformats.org/officeDocument/2006/relationships" xmlns:p="http://schemas.openxmlformats.org/presentationml/2006/main">
   <p:cSld>
     <p:spTree>
@@ -6040,7 +6216,7 @@
 </p:sld>
 </file>
 
-<file path=ppt/slides/slide16.xml><?xml version="1.0" encoding="utf-8"?>
+<file path=ppt/slides/slide17.xml><?xml version="1.0" encoding="utf-8"?>
 <p:sld xmlns:a="http://schemas.openxmlformats.org/drawingml/2006/main" xmlns:r="http://schemas.openxmlformats.org/officeDocument/2006/relationships" xmlns:p="http://schemas.openxmlformats.org/presentationml/2006/main">
   <p:cSld>
     <p:spTree>
@@ -6467,7 +6643,7 @@
 </p:sld>
 </file>
 
-<file path=ppt/slides/slide17.xml><?xml version="1.0" encoding="utf-8"?>
+<file path=ppt/slides/slide18.xml><?xml version="1.0" encoding="utf-8"?>
 <p:sld xmlns:a="http://schemas.openxmlformats.org/drawingml/2006/main" xmlns:r="http://schemas.openxmlformats.org/officeDocument/2006/relationships" xmlns:p="http://schemas.openxmlformats.org/presentationml/2006/main">
   <p:cSld>
     <p:spTree>
@@ -6922,7 +7098,7 @@
 </p:sld>
 </file>
 
-<file path=ppt/slides/slide18.xml><?xml version="1.0" encoding="utf-8"?>
+<file path=ppt/slides/slide19.xml><?xml version="1.0" encoding="utf-8"?>
 <p:sld xmlns:a="http://schemas.openxmlformats.org/drawingml/2006/main" xmlns:r="http://schemas.openxmlformats.org/officeDocument/2006/relationships" xmlns:p="http://schemas.openxmlformats.org/presentationml/2006/main">
   <p:cSld>
     <p:spTree>
@@ -7326,7 +7502,117 @@
 </p:sld>
 </file>
 
-<file path=ppt/slides/slide19.xml><?xml version="1.0" encoding="utf-8"?>
+<file path=ppt/slides/slide2.xml><?xml version="1.0" encoding="utf-8"?>
+<p:sld xmlns:a="http://schemas.openxmlformats.org/drawingml/2006/main" xmlns:r="http://schemas.openxmlformats.org/officeDocument/2006/relationships" xmlns:p="http://schemas.openxmlformats.org/presentationml/2006/main">
+  <p:cSld>
+    <p:spTree>
+      <p:nvGrpSpPr>
+        <p:cNvPr id="1" name=""/>
+        <p:cNvGrpSpPr/>
+        <p:nvPr/>
+      </p:nvGrpSpPr>
+      <p:grpSpPr>
+        <a:xfrm>
+          <a:off x="0" y="0"/>
+          <a:ext cx="0" cy="0"/>
+          <a:chOff x="0" y="0"/>
+          <a:chExt cx="0" cy="0"/>
+        </a:xfrm>
+      </p:grpSpPr>
+      <p:sp>
+        <p:nvSpPr>
+          <p:cNvPr id="2" name="Title 1">
+            <a:extLst>
+              <a:ext uri="{FF2B5EF4-FFF2-40B4-BE49-F238E27FC236}">
+                <a16:creationId xmlns:a16="http://schemas.microsoft.com/office/drawing/2014/main" id="{4E985383-639C-BC42-7713-FC5ED96867F1}"/>
+              </a:ext>
+            </a:extLst>
+          </p:cNvPr>
+          <p:cNvSpPr>
+            <a:spLocks noGrp="1"/>
+          </p:cNvSpPr>
+          <p:nvPr>
+            <p:ph type="title"/>
+          </p:nvPr>
+        </p:nvSpPr>
+        <p:spPr/>
+        <p:txBody>
+          <a:bodyPr/>
+          <a:lstStyle/>
+          <a:p>
+            <a:r>
+              <a:rPr lang="en-US" dirty="0"/>
+              <a:t>Big picture</a:t>
+            </a:r>
+          </a:p>
+        </p:txBody>
+      </p:sp>
+      <p:sp>
+        <p:nvSpPr>
+          <p:cNvPr id="3" name="Content Placeholder 2">
+            <a:extLst>
+              <a:ext uri="{FF2B5EF4-FFF2-40B4-BE49-F238E27FC236}">
+                <a16:creationId xmlns:a16="http://schemas.microsoft.com/office/drawing/2014/main" id="{E05100A0-EC9F-1392-F8B3-CF7FEF7A7D27}"/>
+              </a:ext>
+            </a:extLst>
+          </p:cNvPr>
+          <p:cNvSpPr>
+            <a:spLocks noGrp="1"/>
+          </p:cNvSpPr>
+          <p:nvPr>
+            <p:ph idx="1"/>
+          </p:nvPr>
+        </p:nvSpPr>
+        <p:spPr>
+          <a:xfrm>
+            <a:off x="266700" y="1600200"/>
+            <a:ext cx="8597900" cy="4525963"/>
+          </a:xfrm>
+        </p:spPr>
+        <p:txBody>
+          <a:bodyPr>
+            <a:normAutofit/>
+          </a:bodyPr>
+          <a:lstStyle/>
+          <a:p>
+            <a:r>
+              <a:rPr lang="en-US" dirty="0"/>
+              <a:t>Performance modeling: Estimating performance of a hypothetical system so system designer can compare different options</a:t>
+            </a:r>
+          </a:p>
+          <a:p>
+            <a:pPr lvl="1"/>
+            <a:endParaRPr lang="en-US" dirty="0"/>
+          </a:p>
+          <a:p>
+            <a:r>
+              <a:rPr lang="en-US" dirty="0"/>
+              <a:t>Today: Consider different configurations of cores</a:t>
+            </a:r>
+          </a:p>
+          <a:p>
+            <a:pPr lvl="1"/>
+            <a:r>
+              <a:rPr lang="en-US" dirty="0"/>
+              <a:t>Assumption: Total processor size (silicon area) is the same for all configurations</a:t>
+            </a:r>
+          </a:p>
+        </p:txBody>
+      </p:sp>
+    </p:spTree>
+    <p:extLst>
+      <p:ext uri="{BB962C8B-B14F-4D97-AF65-F5344CB8AC3E}">
+        <p14:creationId xmlns:p14="http://schemas.microsoft.com/office/powerpoint/2010/main" val="3690210948"/>
+      </p:ext>
+    </p:extLst>
+  </p:cSld>
+  <p:clrMapOvr>
+    <a:masterClrMapping/>
+  </p:clrMapOvr>
+</p:sld>
+</file>
+
+<file path=ppt/slides/slide20.xml><?xml version="1.0" encoding="utf-8"?>
 <p:sld xmlns:a="http://schemas.openxmlformats.org/drawingml/2006/main" xmlns:r="http://schemas.openxmlformats.org/officeDocument/2006/relationships" xmlns:p="http://schemas.openxmlformats.org/presentationml/2006/main">
   <p:cSld>
     <p:spTree>
@@ -7742,7 +8028,7 @@
 </p:sld>
 </file>
 
-<file path=ppt/slides/slide2.xml><?xml version="1.0" encoding="utf-8"?>
+<file path=ppt/slides/slide21.xml><?xml version="1.0" encoding="utf-8"?>
 <p:sld xmlns:a="http://schemas.openxmlformats.org/drawingml/2006/main" xmlns:r="http://schemas.openxmlformats.org/officeDocument/2006/relationships" xmlns:p="http://schemas.openxmlformats.org/presentationml/2006/main">
   <p:cSld>
     <p:spTree>
@@ -7771,83 +8057,6 @@
         </p:nvSpPr>
         <p:spPr/>
         <p:txBody>
-          <a:bodyPr/>
-          <a:lstStyle/>
-          <a:p>
-            <a:r>
-              <a:rPr lang="en-US" dirty="0"/>
-              <a:t>Pollack’s rule</a:t>
-            </a:r>
-          </a:p>
-        </p:txBody>
-      </p:sp>
-      <p:sp>
-        <p:nvSpPr>
-          <p:cNvPr id="3" name="Content Placeholder 2"/>
-          <p:cNvSpPr>
-            <a:spLocks noGrp="1"/>
-          </p:cNvSpPr>
-          <p:nvPr>
-            <p:ph idx="1"/>
-          </p:nvPr>
-        </p:nvSpPr>
-        <p:spPr>
-          <a:xfrm>
-            <a:off x="457200" y="1600200"/>
-            <a:ext cx="8229600" cy="1062421"/>
-          </a:xfrm>
-        </p:spPr>
-        <p:txBody>
-          <a:bodyPr/>
-          <a:lstStyle/>
-          <a:p>
-            <a:r>
-              <a:rPr lang="en-US" sz="2800" dirty="0"/>
-              <a:t>The performance of a processing core is proportional to the square root of its area</a:t>
-            </a:r>
-          </a:p>
-          <a:p>
-            <a:endParaRPr lang="en-US" dirty="0"/>
-          </a:p>
-        </p:txBody>
-      </p:sp>
-    </p:spTree>
-  </p:cSld>
-  <p:clrMapOvr>
-    <a:masterClrMapping/>
-  </p:clrMapOvr>
-</p:sld>
-</file>
-
-<file path=ppt/slides/slide20.xml><?xml version="1.0" encoding="utf-8"?>
-<p:sld xmlns:a="http://schemas.openxmlformats.org/drawingml/2006/main" xmlns:r="http://schemas.openxmlformats.org/officeDocument/2006/relationships" xmlns:p="http://schemas.openxmlformats.org/presentationml/2006/main">
-  <p:cSld>
-    <p:spTree>
-      <p:nvGrpSpPr>
-        <p:cNvPr id="1" name=""/>
-        <p:cNvGrpSpPr/>
-        <p:nvPr/>
-      </p:nvGrpSpPr>
-      <p:grpSpPr>
-        <a:xfrm>
-          <a:off x="0" y="0"/>
-          <a:ext cx="0" cy="0"/>
-          <a:chOff x="0" y="0"/>
-          <a:chExt cx="0" cy="0"/>
-        </a:xfrm>
-      </p:grpSpPr>
-      <p:sp>
-        <p:nvSpPr>
-          <p:cNvPr id="2" name="Title 1"/>
-          <p:cNvSpPr>
-            <a:spLocks noGrp="1"/>
-          </p:cNvSpPr>
-          <p:nvPr>
-            <p:ph type="title"/>
-          </p:nvPr>
-        </p:nvSpPr>
-        <p:spPr/>
-        <p:txBody>
           <a:bodyPr>
             <a:normAutofit fontScale="90000"/>
           </a:bodyPr>
@@ -7868,16 +8077,11 @@
           </p:cNvGraphicFramePr>
           <p:nvPr>
             <p:ph idx="1"/>
-            <p:extLst>
-              <p:ext uri="{D42A27DB-BD31-4B8C-83A1-F6EECF244321}">
-                <p14:modId xmlns:p14="http://schemas.microsoft.com/office/powerpoint/2010/main" val="3548755133"/>
-              </p:ext>
-            </p:extLst>
           </p:nvPr>
         </p:nvGraphicFramePr>
         <p:xfrm>
-          <a:off x="1039091" y="2036618"/>
-          <a:ext cx="7065818" cy="1651000"/>
+          <a:off x="1039091" y="2303318"/>
+          <a:ext cx="7065818" cy="1381760"/>
         </p:xfrm>
         <a:graphic>
           <a:graphicData uri="http://schemas.openxmlformats.org/drawingml/2006/table">
@@ -7922,14 +8126,6 @@
                     <a:lstStyle/>
                     <a:p>
                       <a:pPr algn="ctr"/>
-                      <a:r>
-                        <a:rPr lang="en-US" dirty="0"/>
-                        <a:t>% of program that</a:t>
-                      </a:r>
-                      <a:r>
-                        <a:rPr lang="en-US" baseline="0" dirty="0"/>
-                        <a:t> is parallelizable</a:t>
-                      </a:r>
                       <a:endParaRPr lang="en-US" dirty="0">
                         <a:solidFill>
                           <a:schemeClr val="tx1"/>
@@ -8198,10 +8394,45 @@
           </a:p>
         </p:txBody>
       </p:sp>
+      <p:sp>
+        <p:nvSpPr>
+          <p:cNvPr id="5" name="TextBox 4">
+            <a:extLst>
+              <a:ext uri="{FF2B5EF4-FFF2-40B4-BE49-F238E27FC236}">
+                <a16:creationId xmlns:a16="http://schemas.microsoft.com/office/drawing/2014/main" id="{7FC0F04C-AC31-A18A-8143-5D67ECA81A78}"/>
+              </a:ext>
+            </a:extLst>
+          </p:cNvPr>
+          <p:cNvSpPr txBox="1"/>
+          <p:nvPr/>
+        </p:nvSpPr>
+        <p:spPr>
+          <a:xfrm>
+            <a:off x="3784600" y="1931190"/>
+            <a:ext cx="3788080" cy="369332"/>
+          </a:xfrm>
+          <a:prstGeom prst="rect">
+            <a:avLst/>
+          </a:prstGeom>
+          <a:noFill/>
+        </p:spPr>
+        <p:txBody>
+          <a:bodyPr wrap="square" rtlCol="0">
+            <a:spAutoFit/>
+          </a:bodyPr>
+          <a:lstStyle/>
+          <a:p>
+            <a:r>
+              <a:rPr lang="en-US" dirty="0"/>
+              <a:t>% of program that can be parallelized</a:t>
+            </a:r>
+          </a:p>
+        </p:txBody>
+      </p:sp>
     </p:spTree>
     <p:extLst>
       <p:ext uri="{BB962C8B-B14F-4D97-AF65-F5344CB8AC3E}">
-        <p14:creationId xmlns:p14="http://schemas.microsoft.com/office/powerpoint/2010/main" val="3359897303"/>
+        <p14:creationId xmlns:p14="http://schemas.microsoft.com/office/powerpoint/2010/main" val="2334238433"/>
       </p:ext>
     </p:extLst>
   </p:cSld>
@@ -8211,7 +8442,7 @@
 </p:sld>
 </file>
 
-<file path=ppt/slides/slide21.xml><?xml version="1.0" encoding="utf-8"?>
+<file path=ppt/slides/slide22.xml><?xml version="1.0" encoding="utf-8"?>
 <p:sld xmlns:a="http://schemas.openxmlformats.org/drawingml/2006/main" xmlns:r="http://schemas.openxmlformats.org/officeDocument/2006/relationships" xmlns:p="http://schemas.openxmlformats.org/presentationml/2006/main">
   <p:cSld>
     <p:spTree>
@@ -8464,88 +8695,6 @@
           </a:p>
         </p:txBody>
       </p:sp>
-      <p:sp>
-        <p:nvSpPr>
-          <p:cNvPr id="4" name="TextBox 3"/>
-          <p:cNvSpPr txBox="1"/>
-          <p:nvPr/>
-        </p:nvSpPr>
-        <p:spPr>
-          <a:xfrm>
-            <a:off x="457200" y="2664090"/>
-            <a:ext cx="8325262" cy="4247317"/>
-          </a:xfrm>
-          <a:prstGeom prst="rect">
-            <a:avLst/>
-          </a:prstGeom>
-          <a:noFill/>
-        </p:spPr>
-        <p:txBody>
-          <a:bodyPr wrap="square" rtlCol="0">
-            <a:spAutoFit/>
-          </a:bodyPr>
-          <a:lstStyle/>
-          <a:p>
-            <a:r>
-              <a:rPr lang="en-US" sz="2800" dirty="0"/>
-              <a:t>If a single core is replaced by 4 cores, each ¼ as large, what is the expected peak performance of the entire system?  (i.e. the performance assuming all 4 could be kept perfectly busy) </a:t>
-            </a:r>
-          </a:p>
-          <a:p>
-            <a:pPr marL="342900" indent="-342900">
-              <a:buFont typeface="+mj-lt"/>
-              <a:buAutoNum type="alphaUcPeriod"/>
-            </a:pPr>
-            <a:r>
-              <a:rPr lang="en-US" sz="2800" dirty="0"/>
-              <a:t>Half as much as before</a:t>
-            </a:r>
-          </a:p>
-          <a:p>
-            <a:pPr marL="342900" indent="-342900">
-              <a:buFont typeface="+mj-lt"/>
-              <a:buAutoNum type="alphaUcPeriod"/>
-            </a:pPr>
-            <a:r>
-              <a:rPr lang="en-US" sz="2800" dirty="0"/>
-              <a:t>The same as before</a:t>
-            </a:r>
-          </a:p>
-          <a:p>
-            <a:pPr marL="342900" indent="-342900">
-              <a:buFont typeface="+mj-lt"/>
-              <a:buAutoNum type="alphaUcPeriod"/>
-            </a:pPr>
-            <a:r>
-              <a:rPr lang="en-US" sz="2800" dirty="0"/>
-              <a:t>Twice as much as before</a:t>
-            </a:r>
-          </a:p>
-          <a:p>
-            <a:pPr marL="342900" indent="-342900">
-              <a:buFont typeface="+mj-lt"/>
-              <a:buAutoNum type="alphaUcPeriod"/>
-            </a:pPr>
-            <a:r>
-              <a:rPr lang="en-US" sz="2800" dirty="0"/>
-              <a:t>Four times as much as before</a:t>
-            </a:r>
-          </a:p>
-          <a:p>
-            <a:pPr marL="342900" indent="-342900">
-              <a:buFont typeface="+mj-lt"/>
-              <a:buAutoNum type="alphaUcPeriod"/>
-            </a:pPr>
-            <a:r>
-              <a:rPr lang="en-US" sz="2800" dirty="0"/>
-              <a:t>None of the above</a:t>
-            </a:r>
-          </a:p>
-          <a:p>
-            <a:endParaRPr lang="en-US" dirty="0"/>
-          </a:p>
-        </p:txBody>
-      </p:sp>
     </p:spTree>
   </p:cSld>
   <p:clrMapOvr>
@@ -8676,11 +8825,7 @@
               <a:buAutoNum type="alphaUcPeriod"/>
             </a:pPr>
             <a:r>
-              <a:rPr lang="en-US" sz="2800" u="sng" dirty="0">
-                <a:solidFill>
-                  <a:schemeClr val="accent1"/>
-                </a:solidFill>
-              </a:rPr>
+              <a:rPr lang="en-US" sz="2800" dirty="0"/>
               <a:t>Twice as much as before</a:t>
             </a:r>
           </a:p>
@@ -8746,14 +8891,12 @@
         </p:nvSpPr>
         <p:spPr/>
         <p:txBody>
-          <a:bodyPr>
-            <a:noAutofit/>
-          </a:bodyPr>
-          <a:lstStyle/>
-          <a:p>
-            <a:r>
-              <a:rPr lang="en-US" sz="3600" dirty="0"/>
-              <a:t>How does the running time change when a single core is replaced with 4 cores if only half the program can be parallelized?</a:t>
+          <a:bodyPr/>
+          <a:lstStyle/>
+          <a:p>
+            <a:r>
+              <a:rPr lang="en-US" dirty="0"/>
+              <a:t>Pollack’s rule</a:t>
             </a:r>
           </a:p>
         </p:txBody>
@@ -8770,8 +8913,8 @@
         </p:nvSpPr>
         <p:spPr>
           <a:xfrm>
-            <a:off x="457200" y="2136556"/>
-            <a:ext cx="8229600" cy="3989607"/>
+            <a:off x="457200" y="1600200"/>
+            <a:ext cx="8229600" cy="1062421"/>
           </a:xfrm>
         </p:spPr>
         <p:txBody>
@@ -8779,69 +8922,97 @@
           <a:lstStyle/>
           <a:p>
             <a:r>
-              <a:rPr lang="en-US" dirty="0"/>
-              <a:t>Parallel part:</a:t>
-            </a:r>
-          </a:p>
-          <a:p>
-            <a:pPr>
-              <a:buNone/>
+              <a:rPr lang="en-US" sz="2800" dirty="0"/>
+              <a:t>The performance of a processing core is proportional to the square root of its area</a:t>
+            </a:r>
+          </a:p>
+          <a:p>
+            <a:endParaRPr lang="en-US" dirty="0"/>
+          </a:p>
+        </p:txBody>
+      </p:sp>
+      <p:sp>
+        <p:nvSpPr>
+          <p:cNvPr id="4" name="TextBox 3"/>
+          <p:cNvSpPr txBox="1"/>
+          <p:nvPr/>
+        </p:nvSpPr>
+        <p:spPr>
+          <a:xfrm>
+            <a:off x="457200" y="2664090"/>
+            <a:ext cx="8325262" cy="4247317"/>
+          </a:xfrm>
+          <a:prstGeom prst="rect">
+            <a:avLst/>
+          </a:prstGeom>
+          <a:noFill/>
+        </p:spPr>
+        <p:txBody>
+          <a:bodyPr wrap="square" rtlCol="0">
+            <a:spAutoFit/>
+          </a:bodyPr>
+          <a:lstStyle/>
+          <a:p>
+            <a:r>
+              <a:rPr lang="en-US" sz="2800" dirty="0"/>
+              <a:t>If a single core is replaced by 4 cores, each ¼ as large, what is the expected peak performance of the entire system?  (i.e. the performance assuming all 4 could be kept perfectly busy) </a:t>
+            </a:r>
+          </a:p>
+          <a:p>
+            <a:pPr marL="342900" indent="-342900">
+              <a:buFont typeface="+mj-lt"/>
+              <a:buAutoNum type="alphaUcPeriod"/>
             </a:pPr>
             <a:r>
-              <a:rPr lang="en-US" dirty="0"/>
-              <a:t>			½ the work / 2 the performance = ¼ </a:t>
-            </a:r>
-          </a:p>
-          <a:p>
-            <a:r>
-              <a:rPr lang="en-US" dirty="0">
+              <a:rPr lang="en-US" sz="2800" dirty="0"/>
+              <a:t>Half as much as before</a:t>
+            </a:r>
+          </a:p>
+          <a:p>
+            <a:pPr marL="342900" indent="-342900">
+              <a:buFont typeface="+mj-lt"/>
+              <a:buAutoNum type="alphaUcPeriod"/>
+            </a:pPr>
+            <a:r>
+              <a:rPr lang="en-US" sz="2800" dirty="0"/>
+              <a:t>The same as before</a:t>
+            </a:r>
+          </a:p>
+          <a:p>
+            <a:pPr marL="342900" indent="-342900">
+              <a:buFont typeface="+mj-lt"/>
+              <a:buAutoNum type="alphaUcPeriod"/>
+            </a:pPr>
+            <a:r>
+              <a:rPr lang="en-US" sz="2800" u="sng" dirty="0">
                 <a:solidFill>
-                  <a:schemeClr val="bg1"/>
+                  <a:schemeClr val="accent1"/>
                 </a:solidFill>
               </a:rPr>
-              <a:t>Serial part:</a:t>
-            </a:r>
-          </a:p>
-          <a:p>
-            <a:pPr>
-              <a:buNone/>
+              <a:t>Twice as much as before</a:t>
+            </a:r>
+          </a:p>
+          <a:p>
+            <a:pPr marL="342900" indent="-342900">
+              <a:buFont typeface="+mj-lt"/>
+              <a:buAutoNum type="alphaUcPeriod"/>
             </a:pPr>
             <a:r>
-              <a:rPr lang="en-US" dirty="0">
-                <a:solidFill>
-                  <a:schemeClr val="bg1"/>
-                </a:solidFill>
-              </a:rPr>
-              <a:t>			½ the work / ½ the performance = 1</a:t>
-            </a:r>
-          </a:p>
-          <a:p>
-            <a:pPr>
-              <a:buNone/>
+              <a:rPr lang="en-US" sz="2800" dirty="0"/>
+              <a:t>Four times as much as before</a:t>
+            </a:r>
+          </a:p>
+          <a:p>
+            <a:pPr marL="342900" indent="-342900">
+              <a:buFont typeface="+mj-lt"/>
+              <a:buAutoNum type="alphaUcPeriod"/>
             </a:pPr>
-            <a:endParaRPr lang="en-US" dirty="0">
-              <a:solidFill>
-                <a:schemeClr val="bg1"/>
-              </a:solidFill>
-            </a:endParaRPr>
-          </a:p>
-          <a:p>
-            <a:pPr>
-              <a:buNone/>
-            </a:pPr>
-            <a:r>
-              <a:rPr lang="en-US" dirty="0">
-                <a:solidFill>
-                  <a:schemeClr val="bg1"/>
-                </a:solidFill>
-              </a:rPr>
-              <a:t>Total time: 1.25 times as long</a:t>
-            </a:r>
-          </a:p>
-          <a:p>
-            <a:pPr>
-              <a:buNone/>
-            </a:pPr>
+            <a:r>
+              <a:rPr lang="en-US" sz="2800" dirty="0"/>
+              <a:t>None of the above</a:t>
+            </a:r>
+          </a:p>
+          <a:p>
             <a:endParaRPr lang="en-US" dirty="0"/>
           </a:p>
         </p:txBody>
@@ -8931,7 +9102,11 @@
           </a:p>
           <a:p>
             <a:r>
-              <a:rPr lang="en-US" dirty="0"/>
+              <a:rPr lang="en-US" dirty="0">
+                <a:solidFill>
+                  <a:schemeClr val="bg1"/>
+                </a:solidFill>
+              </a:rPr>
               <a:t>Serial part:</a:t>
             </a:r>
           </a:p>
@@ -8940,7 +9115,11 @@
               <a:buNone/>
             </a:pPr>
             <a:r>
-              <a:rPr lang="en-US" dirty="0"/>
+              <a:rPr lang="en-US" dirty="0">
+                <a:solidFill>
+                  <a:schemeClr val="bg1"/>
+                </a:solidFill>
+              </a:rPr>
               <a:t>			½ the work / ½ the performance = 1</a:t>
             </a:r>
           </a:p>
@@ -8948,14 +9127,22 @@
             <a:pPr>
               <a:buNone/>
             </a:pPr>
-            <a:endParaRPr lang="en-US" dirty="0"/>
+            <a:endParaRPr lang="en-US" dirty="0">
+              <a:solidFill>
+                <a:schemeClr val="bg1"/>
+              </a:solidFill>
+            </a:endParaRPr>
           </a:p>
           <a:p>
             <a:pPr>
               <a:buNone/>
             </a:pPr>
             <a:r>
-              <a:rPr lang="en-US" dirty="0"/>
+              <a:rPr lang="en-US" dirty="0">
+                <a:solidFill>
+                  <a:schemeClr val="bg1"/>
+                </a:solidFill>
+              </a:rPr>
               <a:t>Total time: 1.25 times as long</a:t>
             </a:r>
           </a:p>
@@ -8976,6 +9163,127 @@
 </file>
 
 <file path=ppt/slides/slide7.xml><?xml version="1.0" encoding="utf-8"?>
+<p:sld xmlns:a="http://schemas.openxmlformats.org/drawingml/2006/main" xmlns:r="http://schemas.openxmlformats.org/officeDocument/2006/relationships" xmlns:p="http://schemas.openxmlformats.org/presentationml/2006/main">
+  <p:cSld>
+    <p:spTree>
+      <p:nvGrpSpPr>
+        <p:cNvPr id="1" name=""/>
+        <p:cNvGrpSpPr/>
+        <p:nvPr/>
+      </p:nvGrpSpPr>
+      <p:grpSpPr>
+        <a:xfrm>
+          <a:off x="0" y="0"/>
+          <a:ext cx="0" cy="0"/>
+          <a:chOff x="0" y="0"/>
+          <a:chExt cx="0" cy="0"/>
+        </a:xfrm>
+      </p:grpSpPr>
+      <p:sp>
+        <p:nvSpPr>
+          <p:cNvPr id="2" name="Title 1"/>
+          <p:cNvSpPr>
+            <a:spLocks noGrp="1"/>
+          </p:cNvSpPr>
+          <p:nvPr>
+            <p:ph type="title"/>
+          </p:nvPr>
+        </p:nvSpPr>
+        <p:spPr/>
+        <p:txBody>
+          <a:bodyPr>
+            <a:noAutofit/>
+          </a:bodyPr>
+          <a:lstStyle/>
+          <a:p>
+            <a:r>
+              <a:rPr lang="en-US" sz="3600" dirty="0"/>
+              <a:t>How does the running time change when a single core is replaced with 4 cores if only half the program can be parallelized?</a:t>
+            </a:r>
+          </a:p>
+        </p:txBody>
+      </p:sp>
+      <p:sp>
+        <p:nvSpPr>
+          <p:cNvPr id="3" name="Content Placeholder 2"/>
+          <p:cNvSpPr>
+            <a:spLocks noGrp="1"/>
+          </p:cNvSpPr>
+          <p:nvPr>
+            <p:ph idx="1"/>
+          </p:nvPr>
+        </p:nvSpPr>
+        <p:spPr>
+          <a:xfrm>
+            <a:off x="457200" y="2136556"/>
+            <a:ext cx="8229600" cy="3989607"/>
+          </a:xfrm>
+        </p:spPr>
+        <p:txBody>
+          <a:bodyPr/>
+          <a:lstStyle/>
+          <a:p>
+            <a:r>
+              <a:rPr lang="en-US" dirty="0"/>
+              <a:t>Parallel part:</a:t>
+            </a:r>
+          </a:p>
+          <a:p>
+            <a:pPr>
+              <a:buNone/>
+            </a:pPr>
+            <a:r>
+              <a:rPr lang="en-US" dirty="0"/>
+              <a:t>			½ the work / 2 the performance = ¼ </a:t>
+            </a:r>
+          </a:p>
+          <a:p>
+            <a:r>
+              <a:rPr lang="en-US" dirty="0"/>
+              <a:t>Serial part:</a:t>
+            </a:r>
+          </a:p>
+          <a:p>
+            <a:pPr>
+              <a:buNone/>
+            </a:pPr>
+            <a:r>
+              <a:rPr lang="en-US" dirty="0"/>
+              <a:t>			½ the work / ½ the performance = 1</a:t>
+            </a:r>
+          </a:p>
+          <a:p>
+            <a:pPr>
+              <a:buNone/>
+            </a:pPr>
+            <a:endParaRPr lang="en-US" dirty="0"/>
+          </a:p>
+          <a:p>
+            <a:pPr>
+              <a:buNone/>
+            </a:pPr>
+            <a:r>
+              <a:rPr lang="en-US" dirty="0"/>
+              <a:t>Total time: 1.25 times as long</a:t>
+            </a:r>
+          </a:p>
+          <a:p>
+            <a:pPr>
+              <a:buNone/>
+            </a:pPr>
+            <a:endParaRPr lang="en-US" dirty="0"/>
+          </a:p>
+        </p:txBody>
+      </p:sp>
+    </p:spTree>
+  </p:cSld>
+  <p:clrMapOvr>
+    <a:masterClrMapping/>
+  </p:clrMapOvr>
+</p:sld>
+</file>
+
+<file path=ppt/slides/slide8.xml><?xml version="1.0" encoding="utf-8"?>
 <p:sld xmlns:a="http://schemas.openxmlformats.org/drawingml/2006/main" xmlns:r="http://schemas.openxmlformats.org/officeDocument/2006/relationships" xmlns:p="http://schemas.openxmlformats.org/presentationml/2006/main">
   <p:cSld>
     <p:spTree>
@@ -9378,147 +9686,6 @@
 </p:sld>
 </file>
 
-<file path=ppt/slides/slide8.xml><?xml version="1.0" encoding="utf-8"?>
-<p:sld xmlns:a="http://schemas.openxmlformats.org/drawingml/2006/main" xmlns:r="http://schemas.openxmlformats.org/officeDocument/2006/relationships" xmlns:p="http://schemas.openxmlformats.org/presentationml/2006/main">
-  <p:cSld>
-    <p:spTree>
-      <p:nvGrpSpPr>
-        <p:cNvPr id="1" name=""/>
-        <p:cNvGrpSpPr/>
-        <p:nvPr/>
-      </p:nvGrpSpPr>
-      <p:grpSpPr>
-        <a:xfrm>
-          <a:off x="0" y="0"/>
-          <a:ext cx="0" cy="0"/>
-          <a:chOff x="0" y="0"/>
-          <a:chExt cx="0" cy="0"/>
-        </a:xfrm>
-      </p:grpSpPr>
-      <p:sp>
-        <p:nvSpPr>
-          <p:cNvPr id="2" name="Title 1"/>
-          <p:cNvSpPr>
-            <a:spLocks noGrp="1"/>
-          </p:cNvSpPr>
-          <p:nvPr>
-            <p:ph type="title"/>
-          </p:nvPr>
-        </p:nvSpPr>
-        <p:spPr>
-          <a:xfrm>
-            <a:off x="457200" y="274638"/>
-            <a:ext cx="8229600" cy="1553018"/>
-          </a:xfrm>
-        </p:spPr>
-        <p:txBody>
-          <a:bodyPr>
-            <a:noAutofit/>
-          </a:bodyPr>
-          <a:lstStyle/>
-          <a:p>
-            <a:r>
-              <a:rPr lang="en-US" sz="3600"/>
-              <a:t>By what factor does the running time of a program that can be 75% parallelized change on 4 equal-sized cores?</a:t>
-            </a:r>
-            <a:endParaRPr lang="en-US" sz="3600" dirty="0"/>
-          </a:p>
-        </p:txBody>
-      </p:sp>
-      <p:sp>
-        <p:nvSpPr>
-          <p:cNvPr id="3" name="Content Placeholder 2"/>
-          <p:cNvSpPr>
-            <a:spLocks noGrp="1"/>
-          </p:cNvSpPr>
-          <p:nvPr>
-            <p:ph idx="1"/>
-          </p:nvPr>
-        </p:nvSpPr>
-        <p:spPr>
-          <a:xfrm>
-            <a:off x="457200" y="2085072"/>
-            <a:ext cx="8229600" cy="4041091"/>
-          </a:xfrm>
-        </p:spPr>
-        <p:txBody>
-          <a:bodyPr/>
-          <a:lstStyle/>
-          <a:p>
-            <a:pPr marL="514350" indent="-514350">
-              <a:spcAft>
-                <a:spcPts val="600"/>
-              </a:spcAft>
-              <a:buFont typeface="+mj-lt"/>
-              <a:buAutoNum type="alphaUcPeriod"/>
-            </a:pPr>
-            <a:r>
-              <a:rPr lang="en-US" dirty="0"/>
-              <a:t>0.6</a:t>
-            </a:r>
-          </a:p>
-          <a:p>
-            <a:pPr marL="514350" indent="-514350">
-              <a:spcAft>
-                <a:spcPts val="600"/>
-              </a:spcAft>
-              <a:buFont typeface="+mj-lt"/>
-              <a:buAutoNum type="alphaUcPeriod"/>
-            </a:pPr>
-            <a:r>
-              <a:rPr lang="en-US" dirty="0"/>
-              <a:t>0.875</a:t>
-            </a:r>
-          </a:p>
-          <a:p>
-            <a:pPr marL="514350" indent="-514350">
-              <a:spcAft>
-                <a:spcPts val="600"/>
-              </a:spcAft>
-              <a:buFont typeface="+mj-lt"/>
-              <a:buAutoNum type="alphaUcPeriod"/>
-            </a:pPr>
-            <a:r>
-              <a:rPr lang="en-US" dirty="0"/>
-              <a:t>1</a:t>
-            </a:r>
-          </a:p>
-          <a:p>
-            <a:pPr marL="514350" indent="-514350">
-              <a:spcAft>
-                <a:spcPts val="600"/>
-              </a:spcAft>
-              <a:buFont typeface="+mj-lt"/>
-              <a:buAutoNum type="alphaUcPeriod"/>
-            </a:pPr>
-            <a:r>
-              <a:rPr lang="en-US" dirty="0"/>
-              <a:t>1.35</a:t>
-            </a:r>
-          </a:p>
-          <a:p>
-            <a:pPr marL="514350" indent="-514350">
-              <a:spcAft>
-                <a:spcPts val="600"/>
-              </a:spcAft>
-              <a:buFont typeface="+mj-lt"/>
-              <a:buAutoNum type="alphaUcPeriod"/>
-            </a:pPr>
-            <a:r>
-              <a:rPr lang="en-US" dirty="0"/>
-              <a:t>None of the above</a:t>
-            </a:r>
-          </a:p>
-        </p:txBody>
-      </p:sp>
-    </p:spTree>
-  </p:cSld>
-  <p:clrMapOvr>
-    <a:masterClrMapping/>
-  </p:clrMapOvr>
-</p:sld>
-</file>
-
 <file path=ppt/slides/slide9.xml><?xml version="1.0" encoding="utf-8"?>
 <p:sld xmlns:a="http://schemas.openxmlformats.org/drawingml/2006/main" xmlns:r="http://schemas.openxmlformats.org/officeDocument/2006/relationships" xmlns:p="http://schemas.openxmlformats.org/presentationml/2006/main">
   <p:cSld>
@@ -9607,20 +9774,8 @@
               <a:buAutoNum type="alphaUcPeriod"/>
             </a:pPr>
             <a:r>
-              <a:rPr lang="en-US" u="sng" dirty="0">
-                <a:solidFill>
-                  <a:schemeClr val="accent1"/>
-                </a:solidFill>
-              </a:rPr>
+              <a:rPr lang="en-US" dirty="0"/>
               <a:t>0.875</a:t>
-            </a:r>
-            <a:r>
-              <a:rPr lang="en-US" dirty="0">
-                <a:solidFill>
-                  <a:schemeClr val="accent1"/>
-                </a:solidFill>
-              </a:rPr>
-              <a:t>   (0.75/2 + 0.25/0.5)</a:t>
             </a:r>
           </a:p>
           <a:p>

</xml_diff>